<commit_message>
i #10 Added PDF and Updated Structure
- Folder Organization section's first image had text that clipped after wrapping its container.
- PDF version of the cheatsheet was uploaded.
</commit_message>
<xml_diff>
--- a/cheatsheets/modular-parallelization-cheatsheet.pptx
+++ b/cheatsheets/modular-parallelization-cheatsheet.pptx
@@ -2198,7 +2198,7 @@
           </a:ln>
           <a:extLst>
             <a:ext uri="{C572A759-6A51-4108-AA02-DFA0A04FC94B}">
-              <ma14:wrappingTextBoxFlag xmlns="" xmlns:m="http://schemas.openxmlformats.org/officeDocument/2006/math" xmlns:a14="http://schemas.microsoft.com/office/drawing/2010/main" xmlns:ma14="http://schemas.microsoft.com/office/mac/drawingml/2011/main" val="1"/>
+              <ma14:wrappingTextBoxFlag xmlns:ma14="http://schemas.microsoft.com/office/mac/drawingml/2011/main" xmlns:a14="http://schemas.microsoft.com/office/drawing/2010/main" xmlns:m="http://schemas.openxmlformats.org/officeDocument/2006/math" xmlns="" val="1"/>
             </a:ext>
           </a:extLst>
         </p:spPr>
@@ -2237,7 +2237,7 @@
           </a:ln>
           <a:extLst>
             <a:ext uri="{C572A759-6A51-4108-AA02-DFA0A04FC94B}">
-              <ma14:wrappingTextBoxFlag xmlns="" xmlns:m="http://schemas.openxmlformats.org/officeDocument/2006/math" xmlns:a14="http://schemas.microsoft.com/office/drawing/2010/main" xmlns:ma14="http://schemas.microsoft.com/office/mac/drawingml/2011/main" val="1"/>
+              <ma14:wrappingTextBoxFlag xmlns:ma14="http://schemas.microsoft.com/office/mac/drawingml/2011/main" xmlns:a14="http://schemas.microsoft.com/office/drawing/2010/main" xmlns:m="http://schemas.openxmlformats.org/officeDocument/2006/math" xmlns="" val="1"/>
             </a:ext>
           </a:extLst>
         </p:spPr>
@@ -3383,7 +3383,7 @@
           </a:ln>
           <a:extLst>
             <a:ext uri="{C572A759-6A51-4108-AA02-DFA0A04FC94B}">
-              <ma14:wrappingTextBoxFlag xmlns="" xmlns:m="http://schemas.openxmlformats.org/officeDocument/2006/math" xmlns:a14="http://schemas.microsoft.com/office/drawing/2010/main" xmlns:ma14="http://schemas.microsoft.com/office/mac/drawingml/2011/main" val="1"/>
+              <ma14:wrappingTextBoxFlag xmlns:ma14="http://schemas.microsoft.com/office/mac/drawingml/2011/main" xmlns:a14="http://schemas.microsoft.com/office/drawing/2010/main" xmlns:m="http://schemas.openxmlformats.org/officeDocument/2006/math" xmlns="" val="1"/>
             </a:ext>
           </a:extLst>
         </p:spPr>
@@ -3435,7 +3435,7 @@
           </a:ln>
           <a:extLst>
             <a:ext uri="{C572A759-6A51-4108-AA02-DFA0A04FC94B}">
-              <ma14:wrappingTextBoxFlag xmlns="" xmlns:m="http://schemas.openxmlformats.org/officeDocument/2006/math" xmlns:a14="http://schemas.microsoft.com/office/drawing/2010/main" xmlns:ma14="http://schemas.microsoft.com/office/mac/drawingml/2011/main" val="1"/>
+              <ma14:wrappingTextBoxFlag xmlns:ma14="http://schemas.microsoft.com/office/mac/drawingml/2011/main" xmlns:a14="http://schemas.microsoft.com/office/drawing/2010/main" xmlns:m="http://schemas.openxmlformats.org/officeDocument/2006/math" xmlns="" val="1"/>
             </a:ext>
           </a:extLst>
         </p:spPr>
@@ -3533,7 +3533,7 @@
           </a:ln>
           <a:extLst>
             <a:ext uri="{C572A759-6A51-4108-AA02-DFA0A04FC94B}">
-              <ma14:wrappingTextBoxFlag xmlns="" xmlns:m="http://schemas.openxmlformats.org/officeDocument/2006/math" xmlns:a14="http://schemas.microsoft.com/office/drawing/2010/main" xmlns:ma14="http://schemas.microsoft.com/office/mac/drawingml/2011/main" val="1"/>
+              <ma14:wrappingTextBoxFlag xmlns:ma14="http://schemas.microsoft.com/office/mac/drawingml/2011/main" xmlns:a14="http://schemas.microsoft.com/office/drawing/2010/main" xmlns:m="http://schemas.openxmlformats.org/officeDocument/2006/math" xmlns="" val="1"/>
             </a:ext>
           </a:extLst>
         </p:spPr>
@@ -3674,7 +3674,7 @@
           </a:ln>
           <a:extLst>
             <a:ext uri="{C572A759-6A51-4108-AA02-DFA0A04FC94B}">
-              <ma14:wrappingTextBoxFlag xmlns="" xmlns:m="http://schemas.openxmlformats.org/officeDocument/2006/math" xmlns:a14="http://schemas.microsoft.com/office/drawing/2010/main" xmlns:ma14="http://schemas.microsoft.com/office/mac/drawingml/2011/main" val="1"/>
+              <ma14:wrappingTextBoxFlag xmlns:ma14="http://schemas.microsoft.com/office/mac/drawingml/2011/main" xmlns:a14="http://schemas.microsoft.com/office/drawing/2010/main" xmlns:m="http://schemas.openxmlformats.org/officeDocument/2006/math" xmlns="" val="1"/>
             </a:ext>
           </a:extLst>
         </p:spPr>
@@ -3723,7 +3723,7 @@
           </a:ln>
           <a:extLst>
             <a:ext uri="{C572A759-6A51-4108-AA02-DFA0A04FC94B}">
-              <ma14:wrappingTextBoxFlag xmlns="" xmlns:m="http://schemas.openxmlformats.org/officeDocument/2006/math" xmlns:a14="http://schemas.microsoft.com/office/drawing/2010/main" xmlns:ma14="http://schemas.microsoft.com/office/mac/drawingml/2011/main" val="1"/>
+              <ma14:wrappingTextBoxFlag xmlns:ma14="http://schemas.microsoft.com/office/mac/drawingml/2011/main" xmlns:a14="http://schemas.microsoft.com/office/drawing/2010/main" xmlns:m="http://schemas.openxmlformats.org/officeDocument/2006/math" xmlns="" val="1"/>
             </a:ext>
           </a:extLst>
         </p:spPr>
@@ -4042,7 +4042,7 @@
           </a:ln>
           <a:extLst>
             <a:ext uri="{C572A759-6A51-4108-AA02-DFA0A04FC94B}">
-              <ma14:wrappingTextBoxFlag xmlns="" xmlns:m="http://schemas.openxmlformats.org/officeDocument/2006/math" xmlns:a14="http://schemas.microsoft.com/office/drawing/2010/main" xmlns:ma14="http://schemas.microsoft.com/office/mac/drawingml/2011/main" val="1"/>
+              <ma14:wrappingTextBoxFlag xmlns:ma14="http://schemas.microsoft.com/office/mac/drawingml/2011/main" xmlns:a14="http://schemas.microsoft.com/office/drawing/2010/main" xmlns:m="http://schemas.openxmlformats.org/officeDocument/2006/math" xmlns="" val="1"/>
             </a:ext>
           </a:extLst>
         </p:spPr>
@@ -4280,7 +4280,7 @@
           </a:ln>
           <a:extLst>
             <a:ext uri="{C572A759-6A51-4108-AA02-DFA0A04FC94B}">
-              <ma14:wrappingTextBoxFlag xmlns="" xmlns:m="http://schemas.openxmlformats.org/officeDocument/2006/math" xmlns:a14="http://schemas.microsoft.com/office/drawing/2010/main" xmlns:ma14="http://schemas.microsoft.com/office/mac/drawingml/2011/main" val="1"/>
+              <ma14:wrappingTextBoxFlag xmlns:ma14="http://schemas.microsoft.com/office/mac/drawingml/2011/main" xmlns:a14="http://schemas.microsoft.com/office/drawing/2010/main" xmlns:m="http://schemas.openxmlformats.org/officeDocument/2006/math" xmlns="" val="1"/>
             </a:ext>
           </a:extLst>
         </p:spPr>
@@ -6118,7 +6118,7 @@
           </a:ln>
           <a:extLst>
             <a:ext uri="{C572A759-6A51-4108-AA02-DFA0A04FC94B}">
-              <ma14:wrappingTextBoxFlag xmlns="" xmlns:m="http://schemas.openxmlformats.org/officeDocument/2006/math" xmlns:a14="http://schemas.microsoft.com/office/drawing/2010/main" xmlns:ma14="http://schemas.microsoft.com/office/mac/drawingml/2011/main" val="1"/>
+              <ma14:wrappingTextBoxFlag xmlns:ma14="http://schemas.microsoft.com/office/mac/drawingml/2011/main" xmlns:a14="http://schemas.microsoft.com/office/drawing/2010/main" xmlns:m="http://schemas.openxmlformats.org/officeDocument/2006/math" xmlns="" val="1"/>
             </a:ext>
           </a:extLst>
         </p:spPr>
@@ -6312,7 +6312,7 @@
           </a:ln>
           <a:extLst>
             <a:ext uri="{C572A759-6A51-4108-AA02-DFA0A04FC94B}">
-              <ma14:wrappingTextBoxFlag xmlns="" xmlns:m="http://schemas.openxmlformats.org/officeDocument/2006/math" xmlns:a14="http://schemas.microsoft.com/office/drawing/2010/main" xmlns:ma14="http://schemas.microsoft.com/office/mac/drawingml/2011/main" val="1"/>
+              <ma14:wrappingTextBoxFlag xmlns:ma14="http://schemas.microsoft.com/office/mac/drawingml/2011/main" xmlns:a14="http://schemas.microsoft.com/office/drawing/2010/main" xmlns:m="http://schemas.openxmlformats.org/officeDocument/2006/math" xmlns="" val="1"/>
             </a:ext>
           </a:extLst>
         </p:spPr>
@@ -6433,7 +6433,7 @@
           </a:ln>
           <a:extLst>
             <a:ext uri="{C572A759-6A51-4108-AA02-DFA0A04FC94B}">
-              <ma14:wrappingTextBoxFlag xmlns="" xmlns:m="http://schemas.openxmlformats.org/officeDocument/2006/math" xmlns:a14="http://schemas.microsoft.com/office/drawing/2010/main" xmlns:ma14="http://schemas.microsoft.com/office/mac/drawingml/2011/main" val="1"/>
+              <ma14:wrappingTextBoxFlag xmlns:ma14="http://schemas.microsoft.com/office/mac/drawingml/2011/main" xmlns:a14="http://schemas.microsoft.com/office/drawing/2010/main" xmlns:m="http://schemas.openxmlformats.org/officeDocument/2006/math" xmlns="" val="1"/>
             </a:ext>
           </a:extLst>
         </p:spPr>
@@ -6536,7 +6536,7 @@
           </a:ln>
           <a:extLst>
             <a:ext uri="{C572A759-6A51-4108-AA02-DFA0A04FC94B}">
-              <ma14:wrappingTextBoxFlag xmlns="" xmlns:m="http://schemas.openxmlformats.org/officeDocument/2006/math" xmlns:a14="http://schemas.microsoft.com/office/drawing/2010/main" xmlns:ma14="http://schemas.microsoft.com/office/mac/drawingml/2011/main" val="1"/>
+              <ma14:wrappingTextBoxFlag xmlns:ma14="http://schemas.microsoft.com/office/mac/drawingml/2011/main" xmlns:a14="http://schemas.microsoft.com/office/drawing/2010/main" xmlns:m="http://schemas.openxmlformats.org/officeDocument/2006/math" xmlns="" val="1"/>
             </a:ext>
           </a:extLst>
         </p:spPr>
@@ -6658,7 +6658,7 @@
           </a:ln>
           <a:extLst>
             <a:ext uri="{C572A759-6A51-4108-AA02-DFA0A04FC94B}">
-              <ma14:wrappingTextBoxFlag xmlns="" xmlns:ma14="http://schemas.microsoft.com/office/mac/drawingml/2011/main" xmlns:a14="http://schemas.microsoft.com/office/drawing/2010/main" xmlns:m="http://schemas.openxmlformats.org/officeDocument/2006/math" val="1"/>
+              <ma14:wrappingTextBoxFlag xmlns:m="http://schemas.openxmlformats.org/officeDocument/2006/math" xmlns:a14="http://schemas.microsoft.com/office/drawing/2010/main" xmlns:ma14="http://schemas.microsoft.com/office/mac/drawingml/2011/main" xmlns="" val="1"/>
             </a:ext>
           </a:extLst>
         </p:spPr>
@@ -13125,7 +13125,7 @@
           </a:ln>
           <a:extLst>
             <a:ext uri="{C572A759-6A51-4108-AA02-DFA0A04FC94B}">
-              <ma14:wrappingTextBoxFlag xmlns:ma14="http://schemas.microsoft.com/office/mac/drawingml/2011/main" xmlns:a14="http://schemas.microsoft.com/office/drawing/2010/main" xmlns:m="http://schemas.openxmlformats.org/officeDocument/2006/math" xmlns="" val="1"/>
+              <ma14:wrappingTextBoxFlag xmlns="" xmlns:m="http://schemas.openxmlformats.org/officeDocument/2006/math" xmlns:a14="http://schemas.microsoft.com/office/drawing/2010/main" xmlns:ma14="http://schemas.microsoft.com/office/mac/drawingml/2011/main" val="1"/>
             </a:ext>
           </a:extLst>
         </p:spPr>
@@ -18180,378 +18180,6 @@
         </p:grpSpPr>
         <p:sp>
           <p:nvSpPr>
-            <p:cNvPr id="9" name="TextBox 38">
-              <a:extLst>
-                <a:ext uri="{FF2B5EF4-FFF2-40B4-BE49-F238E27FC236}">
-                  <a16:creationId xmlns:a16="http://schemas.microsoft.com/office/drawing/2014/main" id="{E0F82CF5-E785-DFC5-6619-5ADE5E95D52D}"/>
-                </a:ext>
-              </a:extLst>
-            </p:cNvPr>
-            <p:cNvSpPr txBox="1"/>
-            <p:nvPr/>
-          </p:nvSpPr>
-          <p:spPr>
-            <a:xfrm>
-              <a:off x="3153234" y="3168291"/>
-              <a:ext cx="1151299" cy="399394"/>
-            </a:xfrm>
-            <a:prstGeom prst="rect">
-              <a:avLst/>
-            </a:prstGeom>
-            <a:noFill/>
-            <a:ln>
-              <a:solidFill>
-                <a:schemeClr val="tx2"/>
-              </a:solidFill>
-            </a:ln>
-          </p:spPr>
-          <p:txBody>
-            <a:bodyPr rot="0" spcFirstLastPara="0" vert="horz" wrap="square" lIns="91440" tIns="45720" rIns="91440" bIns="45720" numCol="1" spcCol="0" rtlCol="0" fromWordArt="0" anchor="t" anchorCtr="0" forceAA="0" compatLnSpc="1">
-              <a:prstTxWarp prst="textNoShape">
-                <a:avLst/>
-              </a:prstTxWarp>
-              <a:spAutoFit/>
-            </a:bodyPr>
-            <a:lstStyle>
-              <a:defPPr marL="0" marR="0" indent="0" algn="l" defTabSz="914400" rtl="0" fontAlgn="auto" latinLnBrk="1" hangingPunct="0">
-                <a:lnSpc>
-                  <a:spcPct val="100000"/>
-                </a:lnSpc>
-                <a:spcBef>
-                  <a:spcPts val="0"/>
-                </a:spcBef>
-                <a:spcAft>
-                  <a:spcPts val="0"/>
-                </a:spcAft>
-                <a:buClrTx/>
-                <a:buSzTx/>
-                <a:buFontTx/>
-                <a:buNone/>
-                <a:tabLst/>
-                <a:defRPr kumimoji="0" sz="1800" b="0" i="0" u="none" strike="noStrike" cap="none" spc="0" normalizeH="0" baseline="0">
-                  <a:ln>
-                    <a:noFill/>
-                  </a:ln>
-                  <a:solidFill>
-                    <a:srgbClr val="000000"/>
-                  </a:solidFill>
-                  <a:effectLst/>
-                  <a:uFillTx/>
-                </a:defRPr>
-              </a:defPPr>
-              <a:lvl1pPr marL="0" marR="0" indent="0" algn="l" defTabSz="584200" rtl="0" fontAlgn="auto" latinLnBrk="0" hangingPunct="0">
-                <a:lnSpc>
-                  <a:spcPct val="100000"/>
-                </a:lnSpc>
-                <a:spcBef>
-                  <a:spcPts val="200"/>
-                </a:spcBef>
-                <a:spcAft>
-                  <a:spcPts val="0"/>
-                </a:spcAft>
-                <a:buClrTx/>
-                <a:buSzTx/>
-                <a:buFontTx/>
-                <a:buNone/>
-                <a:tabLst/>
-                <a:defRPr kumimoji="0" sz="1200" b="1" i="0" u="none" strike="noStrike" cap="none" spc="0" normalizeH="0" baseline="0">
-                  <a:ln>
-                    <a:noFill/>
-                  </a:ln>
-                  <a:solidFill>
-                    <a:srgbClr val="4C4C4C"/>
-                  </a:solidFill>
-                  <a:effectLst/>
-                  <a:uFillTx/>
-                  <a:latin typeface="Source Sans Pro"/>
-                  <a:ea typeface="Source Sans Pro"/>
-                  <a:cs typeface="Source Sans Pro"/>
-                  <a:sym typeface="Source Sans Pro"/>
-                </a:defRPr>
-              </a:lvl1pPr>
-              <a:lvl2pPr marL="0" marR="0" indent="228600" algn="l" defTabSz="584200" rtl="0" fontAlgn="auto" latinLnBrk="0" hangingPunct="0">
-                <a:lnSpc>
-                  <a:spcPct val="100000"/>
-                </a:lnSpc>
-                <a:spcBef>
-                  <a:spcPts val="200"/>
-                </a:spcBef>
-                <a:spcAft>
-                  <a:spcPts val="0"/>
-                </a:spcAft>
-                <a:buClrTx/>
-                <a:buSzTx/>
-                <a:buFontTx/>
-                <a:buNone/>
-                <a:tabLst/>
-                <a:defRPr kumimoji="0" sz="1200" b="1" i="0" u="none" strike="noStrike" cap="none" spc="0" normalizeH="0" baseline="0">
-                  <a:ln>
-                    <a:noFill/>
-                  </a:ln>
-                  <a:solidFill>
-                    <a:srgbClr val="4C4C4C"/>
-                  </a:solidFill>
-                  <a:effectLst/>
-                  <a:uFillTx/>
-                  <a:latin typeface="Source Sans Pro"/>
-                  <a:ea typeface="Source Sans Pro"/>
-                  <a:cs typeface="Source Sans Pro"/>
-                  <a:sym typeface="Source Sans Pro"/>
-                </a:defRPr>
-              </a:lvl2pPr>
-              <a:lvl3pPr marL="0" marR="0" indent="457200" algn="l" defTabSz="584200" rtl="0" fontAlgn="auto" latinLnBrk="0" hangingPunct="0">
-                <a:lnSpc>
-                  <a:spcPct val="100000"/>
-                </a:lnSpc>
-                <a:spcBef>
-                  <a:spcPts val="200"/>
-                </a:spcBef>
-                <a:spcAft>
-                  <a:spcPts val="0"/>
-                </a:spcAft>
-                <a:buClrTx/>
-                <a:buSzTx/>
-                <a:buFontTx/>
-                <a:buNone/>
-                <a:tabLst/>
-                <a:defRPr kumimoji="0" sz="1200" b="1" i="0" u="none" strike="noStrike" cap="none" spc="0" normalizeH="0" baseline="0">
-                  <a:ln>
-                    <a:noFill/>
-                  </a:ln>
-                  <a:solidFill>
-                    <a:srgbClr val="4C4C4C"/>
-                  </a:solidFill>
-                  <a:effectLst/>
-                  <a:uFillTx/>
-                  <a:latin typeface="Source Sans Pro"/>
-                  <a:ea typeface="Source Sans Pro"/>
-                  <a:cs typeface="Source Sans Pro"/>
-                  <a:sym typeface="Source Sans Pro"/>
-                </a:defRPr>
-              </a:lvl3pPr>
-              <a:lvl4pPr marL="0" marR="0" indent="685800" algn="l" defTabSz="584200" rtl="0" fontAlgn="auto" latinLnBrk="0" hangingPunct="0">
-                <a:lnSpc>
-                  <a:spcPct val="100000"/>
-                </a:lnSpc>
-                <a:spcBef>
-                  <a:spcPts val="200"/>
-                </a:spcBef>
-                <a:spcAft>
-                  <a:spcPts val="0"/>
-                </a:spcAft>
-                <a:buClrTx/>
-                <a:buSzTx/>
-                <a:buFontTx/>
-                <a:buNone/>
-                <a:tabLst/>
-                <a:defRPr kumimoji="0" sz="1200" b="1" i="0" u="none" strike="noStrike" cap="none" spc="0" normalizeH="0" baseline="0">
-                  <a:ln>
-                    <a:noFill/>
-                  </a:ln>
-                  <a:solidFill>
-                    <a:srgbClr val="4C4C4C"/>
-                  </a:solidFill>
-                  <a:effectLst/>
-                  <a:uFillTx/>
-                  <a:latin typeface="Source Sans Pro"/>
-                  <a:ea typeface="Source Sans Pro"/>
-                  <a:cs typeface="Source Sans Pro"/>
-                  <a:sym typeface="Source Sans Pro"/>
-                </a:defRPr>
-              </a:lvl4pPr>
-              <a:lvl5pPr marL="0" marR="0" indent="914400" algn="l" defTabSz="584200" rtl="0" fontAlgn="auto" latinLnBrk="0" hangingPunct="0">
-                <a:lnSpc>
-                  <a:spcPct val="100000"/>
-                </a:lnSpc>
-                <a:spcBef>
-                  <a:spcPts val="200"/>
-                </a:spcBef>
-                <a:spcAft>
-                  <a:spcPts val="0"/>
-                </a:spcAft>
-                <a:buClrTx/>
-                <a:buSzTx/>
-                <a:buFontTx/>
-                <a:buNone/>
-                <a:tabLst/>
-                <a:defRPr kumimoji="0" sz="1200" b="1" i="0" u="none" strike="noStrike" cap="none" spc="0" normalizeH="0" baseline="0">
-                  <a:ln>
-                    <a:noFill/>
-                  </a:ln>
-                  <a:solidFill>
-                    <a:srgbClr val="4C4C4C"/>
-                  </a:solidFill>
-                  <a:effectLst/>
-                  <a:uFillTx/>
-                  <a:latin typeface="Source Sans Pro"/>
-                  <a:ea typeface="Source Sans Pro"/>
-                  <a:cs typeface="Source Sans Pro"/>
-                  <a:sym typeface="Source Sans Pro"/>
-                </a:defRPr>
-              </a:lvl5pPr>
-              <a:lvl6pPr marL="0" marR="0" indent="1143000" algn="l" defTabSz="584200" rtl="0" fontAlgn="auto" latinLnBrk="0" hangingPunct="0">
-                <a:lnSpc>
-                  <a:spcPct val="100000"/>
-                </a:lnSpc>
-                <a:spcBef>
-                  <a:spcPts val="200"/>
-                </a:spcBef>
-                <a:spcAft>
-                  <a:spcPts val="0"/>
-                </a:spcAft>
-                <a:buClrTx/>
-                <a:buSzTx/>
-                <a:buFontTx/>
-                <a:buNone/>
-                <a:tabLst/>
-                <a:defRPr kumimoji="0" sz="1200" b="1" i="0" u="none" strike="noStrike" cap="none" spc="0" normalizeH="0" baseline="0">
-                  <a:ln>
-                    <a:noFill/>
-                  </a:ln>
-                  <a:solidFill>
-                    <a:srgbClr val="4C4C4C"/>
-                  </a:solidFill>
-                  <a:effectLst/>
-                  <a:uFillTx/>
-                  <a:latin typeface="Source Sans Pro"/>
-                  <a:ea typeface="Source Sans Pro"/>
-                  <a:cs typeface="Source Sans Pro"/>
-                  <a:sym typeface="Source Sans Pro"/>
-                </a:defRPr>
-              </a:lvl6pPr>
-              <a:lvl7pPr marL="0" marR="0" indent="1371600" algn="l" defTabSz="584200" rtl="0" fontAlgn="auto" latinLnBrk="0" hangingPunct="0">
-                <a:lnSpc>
-                  <a:spcPct val="100000"/>
-                </a:lnSpc>
-                <a:spcBef>
-                  <a:spcPts val="200"/>
-                </a:spcBef>
-                <a:spcAft>
-                  <a:spcPts val="0"/>
-                </a:spcAft>
-                <a:buClrTx/>
-                <a:buSzTx/>
-                <a:buFontTx/>
-                <a:buNone/>
-                <a:tabLst/>
-                <a:defRPr kumimoji="0" sz="1200" b="1" i="0" u="none" strike="noStrike" cap="none" spc="0" normalizeH="0" baseline="0">
-                  <a:ln>
-                    <a:noFill/>
-                  </a:ln>
-                  <a:solidFill>
-                    <a:srgbClr val="4C4C4C"/>
-                  </a:solidFill>
-                  <a:effectLst/>
-                  <a:uFillTx/>
-                  <a:latin typeface="Source Sans Pro"/>
-                  <a:ea typeface="Source Sans Pro"/>
-                  <a:cs typeface="Source Sans Pro"/>
-                  <a:sym typeface="Source Sans Pro"/>
-                </a:defRPr>
-              </a:lvl7pPr>
-              <a:lvl8pPr marL="0" marR="0" indent="1600200" algn="l" defTabSz="584200" rtl="0" fontAlgn="auto" latinLnBrk="0" hangingPunct="0">
-                <a:lnSpc>
-                  <a:spcPct val="100000"/>
-                </a:lnSpc>
-                <a:spcBef>
-                  <a:spcPts val="200"/>
-                </a:spcBef>
-                <a:spcAft>
-                  <a:spcPts val="0"/>
-                </a:spcAft>
-                <a:buClrTx/>
-                <a:buSzTx/>
-                <a:buFontTx/>
-                <a:buNone/>
-                <a:tabLst/>
-                <a:defRPr kumimoji="0" sz="1200" b="1" i="0" u="none" strike="noStrike" cap="none" spc="0" normalizeH="0" baseline="0">
-                  <a:ln>
-                    <a:noFill/>
-                  </a:ln>
-                  <a:solidFill>
-                    <a:srgbClr val="4C4C4C"/>
-                  </a:solidFill>
-                  <a:effectLst/>
-                  <a:uFillTx/>
-                  <a:latin typeface="Source Sans Pro"/>
-                  <a:ea typeface="Source Sans Pro"/>
-                  <a:cs typeface="Source Sans Pro"/>
-                  <a:sym typeface="Source Sans Pro"/>
-                </a:defRPr>
-              </a:lvl8pPr>
-              <a:lvl9pPr marL="0" marR="0" indent="1828800" algn="l" defTabSz="584200" rtl="0" fontAlgn="auto" latinLnBrk="0" hangingPunct="0">
-                <a:lnSpc>
-                  <a:spcPct val="100000"/>
-                </a:lnSpc>
-                <a:spcBef>
-                  <a:spcPts val="200"/>
-                </a:spcBef>
-                <a:spcAft>
-                  <a:spcPts val="0"/>
-                </a:spcAft>
-                <a:buClrTx/>
-                <a:buSzTx/>
-                <a:buFontTx/>
-                <a:buNone/>
-                <a:tabLst/>
-                <a:defRPr kumimoji="0" sz="1200" b="1" i="0" u="none" strike="noStrike" cap="none" spc="0" normalizeH="0" baseline="0">
-                  <a:ln>
-                    <a:noFill/>
-                  </a:ln>
-                  <a:solidFill>
-                    <a:srgbClr val="4C4C4C"/>
-                  </a:solidFill>
-                  <a:effectLst/>
-                  <a:uFillTx/>
-                  <a:latin typeface="Source Sans Pro"/>
-                  <a:ea typeface="Source Sans Pro"/>
-                  <a:cs typeface="Source Sans Pro"/>
-                  <a:sym typeface="Source Sans Pro"/>
-                </a:defRPr>
-              </a:lvl9pPr>
-            </a:lstStyle>
-            <a:p>
-              <a:pPr marL="285750" indent="-285750" algn="l">
-                <a:buFont typeface="Wingdings"/>
-                <a:buChar char="§"/>
-              </a:pPr>
-              <a:r>
-                <a:rPr lang="en-US" sz="900" err="1">
-                  <a:solidFill>
-                    <a:schemeClr val="accent5"/>
-                  </a:solidFill>
-                </a:rPr>
-                <a:t>mailing_list</a:t>
-              </a:r>
-              <a:endParaRPr lang="en-US" sz="900">
-                <a:solidFill>
-                  <a:schemeClr val="accent5"/>
-                </a:solidFill>
-              </a:endParaRPr>
-            </a:p>
-            <a:p>
-              <a:pPr marL="285750" indent="-285750">
-                <a:buFont typeface="Wingdings"/>
-                <a:buChar char="§"/>
-              </a:pPr>
-              <a:r>
-                <a:rPr lang="en-US" sz="900" err="1">
-                  <a:solidFill>
-                    <a:schemeClr val="accent1"/>
-                  </a:solidFill>
-                </a:rPr>
-                <a:t>issue_tracker</a:t>
-              </a:r>
-              <a:endParaRPr lang="en-US" sz="900">
-                <a:solidFill>
-                  <a:schemeClr val="accent1"/>
-                </a:solidFill>
-              </a:endParaRPr>
-            </a:p>
-          </p:txBody>
-        </p:sp>
-        <p:sp>
-          <p:nvSpPr>
             <p:cNvPr id="10" name="TextBox 141">
               <a:extLst>
                 <a:ext uri="{FF2B5EF4-FFF2-40B4-BE49-F238E27FC236}">
@@ -18887,7 +18515,7 @@
             </a:lstStyle>
             <a:p>
               <a:r>
-                <a:rPr lang="en-US" sz="900" b="0" err="1">
+                <a:rPr lang="en-US" sz="900" b="0" dirty="0" err="1">
                   <a:solidFill>
                     <a:schemeClr val="bg2">
                       <a:lumMod val="10000"/>
@@ -18898,7 +18526,7 @@
                 </a:rPr>
                 <a:t>project_of_interest</a:t>
               </a:r>
-              <a:endParaRPr lang="en-US" sz="900" b="0">
+              <a:endParaRPr lang="en-US" sz="900" b="0" dirty="0">
                 <a:solidFill>
                   <a:schemeClr val="bg2">
                     <a:lumMod val="10000"/>
@@ -18941,7 +18569,7 @@
                 </a:rPr>
                 <a:t>jira</a:t>
               </a:r>
-              <a:endParaRPr lang="en-US" sz="900" b="0">
+              <a:endParaRPr lang="en-US" sz="900" b="0" dirty="0">
                 <a:solidFill>
                   <a:schemeClr val="accent1"/>
                 </a:solidFill>
@@ -19613,7 +19241,7 @@
                 </a:rPr>
                 <a:t>save_mbox_mail</a:t>
               </a:r>
-              <a:endParaRPr lang="en-US" b="0">
+              <a:endParaRPr lang="en-US" b="0" dirty="0">
                 <a:solidFill>
                   <a:schemeClr val="accent5"/>
                 </a:solidFill>
@@ -19638,6 +19266,378 @@
                 </a:solidFill>
                 <a:ea typeface="+mn-lt"/>
                 <a:cs typeface="+mn-lt"/>
+              </a:endParaRPr>
+            </a:p>
+          </p:txBody>
+        </p:sp>
+        <p:sp>
+          <p:nvSpPr>
+            <p:cNvPr id="9" name="TextBox 38">
+              <a:extLst>
+                <a:ext uri="{FF2B5EF4-FFF2-40B4-BE49-F238E27FC236}">
+                  <a16:creationId xmlns:a16="http://schemas.microsoft.com/office/drawing/2014/main" id="{E0F82CF5-E785-DFC5-6619-5ADE5E95D52D}"/>
+                </a:ext>
+              </a:extLst>
+            </p:cNvPr>
+            <p:cNvSpPr txBox="1"/>
+            <p:nvPr/>
+          </p:nvSpPr>
+          <p:spPr>
+            <a:xfrm>
+              <a:off x="3137864" y="3168291"/>
+              <a:ext cx="1166670" cy="399393"/>
+            </a:xfrm>
+            <a:prstGeom prst="rect">
+              <a:avLst/>
+            </a:prstGeom>
+            <a:noFill/>
+            <a:ln>
+              <a:solidFill>
+                <a:schemeClr val="tx2"/>
+              </a:solidFill>
+            </a:ln>
+          </p:spPr>
+          <p:txBody>
+            <a:bodyPr rot="0" spcFirstLastPara="0" vert="horz" wrap="square" lIns="91440" tIns="45720" rIns="91440" bIns="45720" numCol="1" spcCol="0" rtlCol="0" fromWordArt="0" anchor="t" anchorCtr="0" forceAA="0" compatLnSpc="1">
+              <a:prstTxWarp prst="textNoShape">
+                <a:avLst/>
+              </a:prstTxWarp>
+              <a:spAutoFit/>
+            </a:bodyPr>
+            <a:lstStyle>
+              <a:defPPr marL="0" marR="0" indent="0" algn="l" defTabSz="914400" rtl="0" fontAlgn="auto" latinLnBrk="1" hangingPunct="0">
+                <a:lnSpc>
+                  <a:spcPct val="100000"/>
+                </a:lnSpc>
+                <a:spcBef>
+                  <a:spcPts val="0"/>
+                </a:spcBef>
+                <a:spcAft>
+                  <a:spcPts val="0"/>
+                </a:spcAft>
+                <a:buClrTx/>
+                <a:buSzTx/>
+                <a:buFontTx/>
+                <a:buNone/>
+                <a:tabLst/>
+                <a:defRPr kumimoji="0" sz="1800" b="0" i="0" u="none" strike="noStrike" cap="none" spc="0" normalizeH="0" baseline="0">
+                  <a:ln>
+                    <a:noFill/>
+                  </a:ln>
+                  <a:solidFill>
+                    <a:srgbClr val="000000"/>
+                  </a:solidFill>
+                  <a:effectLst/>
+                  <a:uFillTx/>
+                </a:defRPr>
+              </a:defPPr>
+              <a:lvl1pPr marL="0" marR="0" indent="0" algn="l" defTabSz="584200" rtl="0" fontAlgn="auto" latinLnBrk="0" hangingPunct="0">
+                <a:lnSpc>
+                  <a:spcPct val="100000"/>
+                </a:lnSpc>
+                <a:spcBef>
+                  <a:spcPts val="200"/>
+                </a:spcBef>
+                <a:spcAft>
+                  <a:spcPts val="0"/>
+                </a:spcAft>
+                <a:buClrTx/>
+                <a:buSzTx/>
+                <a:buFontTx/>
+                <a:buNone/>
+                <a:tabLst/>
+                <a:defRPr kumimoji="0" sz="1200" b="1" i="0" u="none" strike="noStrike" cap="none" spc="0" normalizeH="0" baseline="0">
+                  <a:ln>
+                    <a:noFill/>
+                  </a:ln>
+                  <a:solidFill>
+                    <a:srgbClr val="4C4C4C"/>
+                  </a:solidFill>
+                  <a:effectLst/>
+                  <a:uFillTx/>
+                  <a:latin typeface="Source Sans Pro"/>
+                  <a:ea typeface="Source Sans Pro"/>
+                  <a:cs typeface="Source Sans Pro"/>
+                  <a:sym typeface="Source Sans Pro"/>
+                </a:defRPr>
+              </a:lvl1pPr>
+              <a:lvl2pPr marL="0" marR="0" indent="228600" algn="l" defTabSz="584200" rtl="0" fontAlgn="auto" latinLnBrk="0" hangingPunct="0">
+                <a:lnSpc>
+                  <a:spcPct val="100000"/>
+                </a:lnSpc>
+                <a:spcBef>
+                  <a:spcPts val="200"/>
+                </a:spcBef>
+                <a:spcAft>
+                  <a:spcPts val="0"/>
+                </a:spcAft>
+                <a:buClrTx/>
+                <a:buSzTx/>
+                <a:buFontTx/>
+                <a:buNone/>
+                <a:tabLst/>
+                <a:defRPr kumimoji="0" sz="1200" b="1" i="0" u="none" strike="noStrike" cap="none" spc="0" normalizeH="0" baseline="0">
+                  <a:ln>
+                    <a:noFill/>
+                  </a:ln>
+                  <a:solidFill>
+                    <a:srgbClr val="4C4C4C"/>
+                  </a:solidFill>
+                  <a:effectLst/>
+                  <a:uFillTx/>
+                  <a:latin typeface="Source Sans Pro"/>
+                  <a:ea typeface="Source Sans Pro"/>
+                  <a:cs typeface="Source Sans Pro"/>
+                  <a:sym typeface="Source Sans Pro"/>
+                </a:defRPr>
+              </a:lvl2pPr>
+              <a:lvl3pPr marL="0" marR="0" indent="457200" algn="l" defTabSz="584200" rtl="0" fontAlgn="auto" latinLnBrk="0" hangingPunct="0">
+                <a:lnSpc>
+                  <a:spcPct val="100000"/>
+                </a:lnSpc>
+                <a:spcBef>
+                  <a:spcPts val="200"/>
+                </a:spcBef>
+                <a:spcAft>
+                  <a:spcPts val="0"/>
+                </a:spcAft>
+                <a:buClrTx/>
+                <a:buSzTx/>
+                <a:buFontTx/>
+                <a:buNone/>
+                <a:tabLst/>
+                <a:defRPr kumimoji="0" sz="1200" b="1" i="0" u="none" strike="noStrike" cap="none" spc="0" normalizeH="0" baseline="0">
+                  <a:ln>
+                    <a:noFill/>
+                  </a:ln>
+                  <a:solidFill>
+                    <a:srgbClr val="4C4C4C"/>
+                  </a:solidFill>
+                  <a:effectLst/>
+                  <a:uFillTx/>
+                  <a:latin typeface="Source Sans Pro"/>
+                  <a:ea typeface="Source Sans Pro"/>
+                  <a:cs typeface="Source Sans Pro"/>
+                  <a:sym typeface="Source Sans Pro"/>
+                </a:defRPr>
+              </a:lvl3pPr>
+              <a:lvl4pPr marL="0" marR="0" indent="685800" algn="l" defTabSz="584200" rtl="0" fontAlgn="auto" latinLnBrk="0" hangingPunct="0">
+                <a:lnSpc>
+                  <a:spcPct val="100000"/>
+                </a:lnSpc>
+                <a:spcBef>
+                  <a:spcPts val="200"/>
+                </a:spcBef>
+                <a:spcAft>
+                  <a:spcPts val="0"/>
+                </a:spcAft>
+                <a:buClrTx/>
+                <a:buSzTx/>
+                <a:buFontTx/>
+                <a:buNone/>
+                <a:tabLst/>
+                <a:defRPr kumimoji="0" sz="1200" b="1" i="0" u="none" strike="noStrike" cap="none" spc="0" normalizeH="0" baseline="0">
+                  <a:ln>
+                    <a:noFill/>
+                  </a:ln>
+                  <a:solidFill>
+                    <a:srgbClr val="4C4C4C"/>
+                  </a:solidFill>
+                  <a:effectLst/>
+                  <a:uFillTx/>
+                  <a:latin typeface="Source Sans Pro"/>
+                  <a:ea typeface="Source Sans Pro"/>
+                  <a:cs typeface="Source Sans Pro"/>
+                  <a:sym typeface="Source Sans Pro"/>
+                </a:defRPr>
+              </a:lvl4pPr>
+              <a:lvl5pPr marL="0" marR="0" indent="914400" algn="l" defTabSz="584200" rtl="0" fontAlgn="auto" latinLnBrk="0" hangingPunct="0">
+                <a:lnSpc>
+                  <a:spcPct val="100000"/>
+                </a:lnSpc>
+                <a:spcBef>
+                  <a:spcPts val="200"/>
+                </a:spcBef>
+                <a:spcAft>
+                  <a:spcPts val="0"/>
+                </a:spcAft>
+                <a:buClrTx/>
+                <a:buSzTx/>
+                <a:buFontTx/>
+                <a:buNone/>
+                <a:tabLst/>
+                <a:defRPr kumimoji="0" sz="1200" b="1" i="0" u="none" strike="noStrike" cap="none" spc="0" normalizeH="0" baseline="0">
+                  <a:ln>
+                    <a:noFill/>
+                  </a:ln>
+                  <a:solidFill>
+                    <a:srgbClr val="4C4C4C"/>
+                  </a:solidFill>
+                  <a:effectLst/>
+                  <a:uFillTx/>
+                  <a:latin typeface="Source Sans Pro"/>
+                  <a:ea typeface="Source Sans Pro"/>
+                  <a:cs typeface="Source Sans Pro"/>
+                  <a:sym typeface="Source Sans Pro"/>
+                </a:defRPr>
+              </a:lvl5pPr>
+              <a:lvl6pPr marL="0" marR="0" indent="1143000" algn="l" defTabSz="584200" rtl="0" fontAlgn="auto" latinLnBrk="0" hangingPunct="0">
+                <a:lnSpc>
+                  <a:spcPct val="100000"/>
+                </a:lnSpc>
+                <a:spcBef>
+                  <a:spcPts val="200"/>
+                </a:spcBef>
+                <a:spcAft>
+                  <a:spcPts val="0"/>
+                </a:spcAft>
+                <a:buClrTx/>
+                <a:buSzTx/>
+                <a:buFontTx/>
+                <a:buNone/>
+                <a:tabLst/>
+                <a:defRPr kumimoji="0" sz="1200" b="1" i="0" u="none" strike="noStrike" cap="none" spc="0" normalizeH="0" baseline="0">
+                  <a:ln>
+                    <a:noFill/>
+                  </a:ln>
+                  <a:solidFill>
+                    <a:srgbClr val="4C4C4C"/>
+                  </a:solidFill>
+                  <a:effectLst/>
+                  <a:uFillTx/>
+                  <a:latin typeface="Source Sans Pro"/>
+                  <a:ea typeface="Source Sans Pro"/>
+                  <a:cs typeface="Source Sans Pro"/>
+                  <a:sym typeface="Source Sans Pro"/>
+                </a:defRPr>
+              </a:lvl6pPr>
+              <a:lvl7pPr marL="0" marR="0" indent="1371600" algn="l" defTabSz="584200" rtl="0" fontAlgn="auto" latinLnBrk="0" hangingPunct="0">
+                <a:lnSpc>
+                  <a:spcPct val="100000"/>
+                </a:lnSpc>
+                <a:spcBef>
+                  <a:spcPts val="200"/>
+                </a:spcBef>
+                <a:spcAft>
+                  <a:spcPts val="0"/>
+                </a:spcAft>
+                <a:buClrTx/>
+                <a:buSzTx/>
+                <a:buFontTx/>
+                <a:buNone/>
+                <a:tabLst/>
+                <a:defRPr kumimoji="0" sz="1200" b="1" i="0" u="none" strike="noStrike" cap="none" spc="0" normalizeH="0" baseline="0">
+                  <a:ln>
+                    <a:noFill/>
+                  </a:ln>
+                  <a:solidFill>
+                    <a:srgbClr val="4C4C4C"/>
+                  </a:solidFill>
+                  <a:effectLst/>
+                  <a:uFillTx/>
+                  <a:latin typeface="Source Sans Pro"/>
+                  <a:ea typeface="Source Sans Pro"/>
+                  <a:cs typeface="Source Sans Pro"/>
+                  <a:sym typeface="Source Sans Pro"/>
+                </a:defRPr>
+              </a:lvl7pPr>
+              <a:lvl8pPr marL="0" marR="0" indent="1600200" algn="l" defTabSz="584200" rtl="0" fontAlgn="auto" latinLnBrk="0" hangingPunct="0">
+                <a:lnSpc>
+                  <a:spcPct val="100000"/>
+                </a:lnSpc>
+                <a:spcBef>
+                  <a:spcPts val="200"/>
+                </a:spcBef>
+                <a:spcAft>
+                  <a:spcPts val="0"/>
+                </a:spcAft>
+                <a:buClrTx/>
+                <a:buSzTx/>
+                <a:buFontTx/>
+                <a:buNone/>
+                <a:tabLst/>
+                <a:defRPr kumimoji="0" sz="1200" b="1" i="0" u="none" strike="noStrike" cap="none" spc="0" normalizeH="0" baseline="0">
+                  <a:ln>
+                    <a:noFill/>
+                  </a:ln>
+                  <a:solidFill>
+                    <a:srgbClr val="4C4C4C"/>
+                  </a:solidFill>
+                  <a:effectLst/>
+                  <a:uFillTx/>
+                  <a:latin typeface="Source Sans Pro"/>
+                  <a:ea typeface="Source Sans Pro"/>
+                  <a:cs typeface="Source Sans Pro"/>
+                  <a:sym typeface="Source Sans Pro"/>
+                </a:defRPr>
+              </a:lvl8pPr>
+              <a:lvl9pPr marL="0" marR="0" indent="1828800" algn="l" defTabSz="584200" rtl="0" fontAlgn="auto" latinLnBrk="0" hangingPunct="0">
+                <a:lnSpc>
+                  <a:spcPct val="100000"/>
+                </a:lnSpc>
+                <a:spcBef>
+                  <a:spcPts val="200"/>
+                </a:spcBef>
+                <a:spcAft>
+                  <a:spcPts val="0"/>
+                </a:spcAft>
+                <a:buClrTx/>
+                <a:buSzTx/>
+                <a:buFontTx/>
+                <a:buNone/>
+                <a:tabLst/>
+                <a:defRPr kumimoji="0" sz="1200" b="1" i="0" u="none" strike="noStrike" cap="none" spc="0" normalizeH="0" baseline="0">
+                  <a:ln>
+                    <a:noFill/>
+                  </a:ln>
+                  <a:solidFill>
+                    <a:srgbClr val="4C4C4C"/>
+                  </a:solidFill>
+                  <a:effectLst/>
+                  <a:uFillTx/>
+                  <a:latin typeface="Source Sans Pro"/>
+                  <a:ea typeface="Source Sans Pro"/>
+                  <a:cs typeface="Source Sans Pro"/>
+                  <a:sym typeface="Source Sans Pro"/>
+                </a:defRPr>
+              </a:lvl9pPr>
+            </a:lstStyle>
+            <a:p>
+              <a:pPr marL="285750" indent="-285750" algn="l">
+                <a:buFont typeface="Wingdings"/>
+                <a:buChar char="§"/>
+              </a:pPr>
+              <a:r>
+                <a:rPr lang="en-US" sz="900" dirty="0" err="1">
+                  <a:solidFill>
+                    <a:schemeClr val="accent5"/>
+                  </a:solidFill>
+                </a:rPr>
+                <a:t>mailing_list</a:t>
+              </a:r>
+              <a:endParaRPr lang="en-US" sz="900" dirty="0">
+                <a:solidFill>
+                  <a:schemeClr val="accent5"/>
+                </a:solidFill>
+              </a:endParaRPr>
+            </a:p>
+            <a:p>
+              <a:pPr marL="285750" indent="-285750">
+                <a:buFont typeface="Wingdings"/>
+                <a:buChar char="§"/>
+              </a:pPr>
+              <a:r>
+                <a:rPr lang="en-US" sz="900" dirty="0" err="1">
+                  <a:solidFill>
+                    <a:schemeClr val="accent1"/>
+                  </a:solidFill>
+                </a:rPr>
+                <a:t>issue_tracker</a:t>
+              </a:r>
+              <a:endParaRPr lang="en-US" sz="900" dirty="0">
+                <a:solidFill>
+                  <a:schemeClr val="accent1"/>
+                </a:solidFill>
               </a:endParaRPr>
             </a:p>
           </p:txBody>

</xml_diff>